<commit_message>
image folder with updated content
smaller images
</commit_message>
<xml_diff>
--- a/images/Präsentation1.pptx
+++ b/images/Präsentation1.pptx
@@ -211,7 +211,7 @@
           <a:p>
             <a:fld id="{2D9C5240-0946-4949-8BE3-FE6FA568DAA2}" type="datetimeFigureOut">
               <a:rPr lang="de-DE" smtClean="0"/>
-              <a:t>05.06.2024</a:t>
+              <a:t>06.06.2024</a:t>
             </a:fld>
             <a:endParaRPr lang="de-DE"/>
           </a:p>
@@ -712,7 +712,7 @@
           <a:p>
             <a:fld id="{DCDAFCE1-3069-44B5-92BD-8623DD6A1D6A}" type="datetimeFigureOut">
               <a:rPr lang="de-DE" smtClean="0"/>
-              <a:t>05.06.2024</a:t>
+              <a:t>06.06.2024</a:t>
             </a:fld>
             <a:endParaRPr lang="de-DE"/>
           </a:p>
@@ -910,7 +910,7 @@
           <a:p>
             <a:fld id="{DCDAFCE1-3069-44B5-92BD-8623DD6A1D6A}" type="datetimeFigureOut">
               <a:rPr lang="de-DE" smtClean="0"/>
-              <a:t>05.06.2024</a:t>
+              <a:t>06.06.2024</a:t>
             </a:fld>
             <a:endParaRPr lang="de-DE"/>
           </a:p>
@@ -1118,7 +1118,7 @@
           <a:p>
             <a:fld id="{DCDAFCE1-3069-44B5-92BD-8623DD6A1D6A}" type="datetimeFigureOut">
               <a:rPr lang="de-DE" smtClean="0"/>
-              <a:t>05.06.2024</a:t>
+              <a:t>06.06.2024</a:t>
             </a:fld>
             <a:endParaRPr lang="de-DE"/>
           </a:p>
@@ -1316,7 +1316,7 @@
           <a:p>
             <a:fld id="{DCDAFCE1-3069-44B5-92BD-8623DD6A1D6A}" type="datetimeFigureOut">
               <a:rPr lang="de-DE" smtClean="0"/>
-              <a:t>05.06.2024</a:t>
+              <a:t>06.06.2024</a:t>
             </a:fld>
             <a:endParaRPr lang="de-DE"/>
           </a:p>
@@ -1591,7 +1591,7 @@
           <a:p>
             <a:fld id="{DCDAFCE1-3069-44B5-92BD-8623DD6A1D6A}" type="datetimeFigureOut">
               <a:rPr lang="de-DE" smtClean="0"/>
-              <a:t>05.06.2024</a:t>
+              <a:t>06.06.2024</a:t>
             </a:fld>
             <a:endParaRPr lang="de-DE"/>
           </a:p>
@@ -1856,7 +1856,7 @@
           <a:p>
             <a:fld id="{DCDAFCE1-3069-44B5-92BD-8623DD6A1D6A}" type="datetimeFigureOut">
               <a:rPr lang="de-DE" smtClean="0"/>
-              <a:t>05.06.2024</a:t>
+              <a:t>06.06.2024</a:t>
             </a:fld>
             <a:endParaRPr lang="de-DE"/>
           </a:p>
@@ -2268,7 +2268,7 @@
           <a:p>
             <a:fld id="{DCDAFCE1-3069-44B5-92BD-8623DD6A1D6A}" type="datetimeFigureOut">
               <a:rPr lang="de-DE" smtClean="0"/>
-              <a:t>05.06.2024</a:t>
+              <a:t>06.06.2024</a:t>
             </a:fld>
             <a:endParaRPr lang="de-DE"/>
           </a:p>
@@ -2409,7 +2409,7 @@
           <a:p>
             <a:fld id="{DCDAFCE1-3069-44B5-92BD-8623DD6A1D6A}" type="datetimeFigureOut">
               <a:rPr lang="de-DE" smtClean="0"/>
-              <a:t>05.06.2024</a:t>
+              <a:t>06.06.2024</a:t>
             </a:fld>
             <a:endParaRPr lang="de-DE"/>
           </a:p>
@@ -2522,7 +2522,7 @@
           <a:p>
             <a:fld id="{DCDAFCE1-3069-44B5-92BD-8623DD6A1D6A}" type="datetimeFigureOut">
               <a:rPr lang="de-DE" smtClean="0"/>
-              <a:t>05.06.2024</a:t>
+              <a:t>06.06.2024</a:t>
             </a:fld>
             <a:endParaRPr lang="de-DE"/>
           </a:p>
@@ -2833,7 +2833,7 @@
           <a:p>
             <a:fld id="{DCDAFCE1-3069-44B5-92BD-8623DD6A1D6A}" type="datetimeFigureOut">
               <a:rPr lang="de-DE" smtClean="0"/>
-              <a:t>05.06.2024</a:t>
+              <a:t>06.06.2024</a:t>
             </a:fld>
             <a:endParaRPr lang="de-DE"/>
           </a:p>
@@ -3121,7 +3121,7 @@
           <a:p>
             <a:fld id="{DCDAFCE1-3069-44B5-92BD-8623DD6A1D6A}" type="datetimeFigureOut">
               <a:rPr lang="de-DE" smtClean="0"/>
-              <a:t>05.06.2024</a:t>
+              <a:t>06.06.2024</a:t>
             </a:fld>
             <a:endParaRPr lang="de-DE"/>
           </a:p>
@@ -3362,7 +3362,7 @@
           <a:p>
             <a:fld id="{DCDAFCE1-3069-44B5-92BD-8623DD6A1D6A}" type="datetimeFigureOut">
               <a:rPr lang="de-DE" smtClean="0"/>
-              <a:t>05.06.2024</a:t>
+              <a:t>06.06.2024</a:t>
             </a:fld>
             <a:endParaRPr lang="de-DE"/>
           </a:p>
@@ -4572,24 +4572,7 @@
               <a:defRPr/>
             </a:pPr>
             <a:r>
-              <a:rPr kumimoji="0" lang="de-DE" sz="2000" b="1" i="0" u="none" strike="noStrike" kern="1200" cap="none" spc="0" normalizeH="0" baseline="0" noProof="0" dirty="0">
-                <a:ln>
-                  <a:noFill/>
-                </a:ln>
-                <a:solidFill>
-                  <a:schemeClr val="bg1"/>
-                </a:solidFill>
-                <a:effectLst/>
-                <a:uLnTx/>
-                <a:uFillTx/>
-                <a:latin typeface="Aptos" panose="02110004020202020204"/>
-                <a:ea typeface="+mn-ea"/>
-                <a:cs typeface="+mn-cs"/>
-              </a:rPr>
-              <a:t>Ruth Pfosser </a:t>
-            </a:r>
-            <a:r>
-              <a:rPr kumimoji="0" lang="de-DE" sz="1800" b="0" i="0" u="none" strike="noStrike" kern="1200" cap="none" spc="0" normalizeH="0" baseline="0" noProof="0" dirty="0">
+              <a:rPr kumimoji="0" lang="de-DE" b="0" i="0" u="none" strike="noStrike" kern="1200" cap="none" spc="0" normalizeH="0" baseline="0" noProof="0" dirty="0">
                 <a:ln>
                   <a:noFill/>
                 </a:ln>
@@ -4603,7 +4586,7 @@
                 <a:ea typeface="+mn-ea"/>
                 <a:cs typeface="+mn-cs"/>
               </a:rPr>
-              <a:t>a08245118@unet.univie.ac.at</a:t>
+              <a:t>Ruth Pfosser</a:t>
             </a:r>
           </a:p>
         </p:txBody>

</xml_diff>